<commit_message>
Explaining GTheta and epsilon
</commit_message>
<xml_diff>
--- a/AguaClara Water Treatment Plant Design/Diagrams.pptx
+++ b/AguaClara Water Treatment Plant Design/Diagrams.pptx
@@ -35710,10 +35710,10 @@
       </p:grpSpPr>
       <p:grpSp>
         <p:nvGrpSpPr>
-          <p:cNvPr id="43" name="Group 42">
+          <p:cNvPr id="7" name="Group 6">
             <a:extLst>
               <a:ext uri="{FF2B5EF4-FFF2-40B4-BE49-F238E27FC236}">
-                <a16:creationId xmlns:a16="http://schemas.microsoft.com/office/drawing/2014/main" id="{4B8A7A9B-D81C-4DAC-8311-C14DC08A08AA}"/>
+                <a16:creationId xmlns:a16="http://schemas.microsoft.com/office/drawing/2014/main" id="{D9D65AA4-181A-48F5-972D-0911D3F453E1}"/>
               </a:ext>
             </a:extLst>
           </p:cNvPr>
@@ -35723,9 +35723,9 @@
         <p:grpSpPr>
           <a:xfrm>
             <a:off x="4137563" y="2208179"/>
-            <a:ext cx="6074380" cy="3338936"/>
+            <a:ext cx="6074380" cy="3440437"/>
             <a:chOff x="4137563" y="2208179"/>
-            <a:chExt cx="6074380" cy="3338936"/>
+            <a:chExt cx="6074380" cy="3440437"/>
           </a:xfrm>
         </p:grpSpPr>
         <p:grpSp>
@@ -36448,10 +36448,10 @@
         </p:grpSp>
         <p:pic>
           <p:nvPicPr>
-            <p:cNvPr id="42" name="Picture 41">
+            <p:cNvPr id="6" name="Picture 5">
               <a:extLst>
                 <a:ext uri="{FF2B5EF4-FFF2-40B4-BE49-F238E27FC236}">
-                  <a16:creationId xmlns:a16="http://schemas.microsoft.com/office/drawing/2014/main" id="{9D5A3102-7087-474F-B7F1-B851DF5ED736}"/>
+                  <a16:creationId xmlns:a16="http://schemas.microsoft.com/office/drawing/2014/main" id="{1F373B75-F39B-4CDB-91F1-438AC42924E4}"/>
                 </a:ext>
               </a:extLst>
             </p:cNvPr>
@@ -36478,8 +36478,8 @@
           </p:blipFill>
           <p:spPr>
             <a:xfrm>
-              <a:off x="6394944" y="4823707"/>
-              <a:ext cx="1327986" cy="723408"/>
+              <a:off x="5539633" y="4843903"/>
+              <a:ext cx="4357128" cy="804713"/>
             </a:xfrm>
             <a:prstGeom prst="rect">
               <a:avLst/>
@@ -45957,11 +45957,11 @@
 <file path=ppt/tags/tag4.xml><?xml version="1.0" encoding="utf-8"?>
 <p:tagLst xmlns:a="http://schemas.openxmlformats.org/drawingml/2006/main" xmlns:r="http://schemas.openxmlformats.org/officeDocument/2006/relationships" xmlns:p="http://schemas.openxmlformats.org/presentationml/2006/main">
   <p:tag name="OUTPUTDPI" val="1200"/>
-  <p:tag name="ORIGINALHEIGHT" val="260.2175"/>
-  <p:tag name="ORIGINALWIDTH" val="477.6903"/>
-  <p:tag name="LATEXADDIN" val="\documentclass{article}&#10;\usepackage{amsmath}&#10;\usepackage{xcolor}&#10;\pagestyle{empty}&#10;\begin{document}&#10;&#10;\definecolor{Monred}{RGB}{172,0,0}&#10;&#10;$$&#10;G = \frac{\Delta V}{\Delta h}&#10;$$&#10;&#10;&#10;\end{document}"/>
+  <p:tag name="ORIGINALHEIGHT" val="289.4638"/>
+  <p:tag name="ORIGINALWIDTH" val="1567.304"/>
+  <p:tag name="LATEXADDIN" val="\documentclass{article}&#10;\usepackage{amsmath}&#10;\usepackage{xcolor}&#10;\pagestyle{empty}&#10;\begin{document}&#10;&#10;\definecolor{Monred}{RGB}{172,0,0}&#10;&#10;$$&#10;G = \frac{\Delta V}{\Delta h}, \,\,\,\,\, G \, {\rm has \, units \, of \,} \frac{1}{[T]}&#10;$$&#10;&#10;&#10;\end{document}"/>
   <p:tag name="IGUANATEXSIZE" val="20"/>
-  <p:tag name="IGUANATEXCURSOR" val="169"/>
+  <p:tag name="IGUANATEXCURSOR" val="212"/>
   <p:tag name="TRANSPARENCY" val="True"/>
   <p:tag name="FILENAME" val=""/>
   <p:tag name="LATEXENGINEID" val="0"/>

</xml_diff>